<commit_message>
nicely handling 100 laser points, also made background of bot invisible
</commit_message>
<xml_diff>
--- a/_RotatingBot/Drawing.pptx
+++ b/_RotatingBot/Drawing.pptx
@@ -3362,8 +3362,8 @@
         </p:nvSpPr>
         <p:spPr>
           <a:xfrm>
-            <a:off x="3581400" y="2209800"/>
-            <a:ext cx="500068" cy="1009570"/>
+            <a:off x="3656888" y="2264578"/>
+            <a:ext cx="349092" cy="704770"/>
           </a:xfrm>
           <a:prstGeom prst="upArrow">
             <a:avLst/>

</xml_diff>

<commit_message>
plotting s(theta), need to fix definition for angle
</commit_message>
<xml_diff>
--- a/_RotatingBot/Drawing.pptx
+++ b/_RotatingBot/Drawing.pptx
@@ -3394,6 +3394,30 @@
           </a:p>
         </p:txBody>
       </p:sp>
+      <p:pic>
+        <p:nvPicPr>
+          <p:cNvPr id="2" name="Picture 1"/>
+          <p:cNvPicPr>
+            <a:picLocks noChangeAspect="1"/>
+          </p:cNvPicPr>
+          <p:nvPr/>
+        </p:nvPicPr>
+        <p:blipFill>
+          <a:blip r:embed="rId2"/>
+          <a:stretch>
+            <a:fillRect/>
+          </a:stretch>
+        </p:blipFill>
+        <p:spPr>
+          <a:xfrm>
+            <a:off x="5583784" y="1701011"/>
+            <a:ext cx="1219200" cy="1498600"/>
+          </a:xfrm>
+          <a:prstGeom prst="rect">
+            <a:avLst/>
+          </a:prstGeom>
+        </p:spPr>
+      </p:pic>
     </p:spTree>
     <p:extLst>
       <p:ext uri="{BB962C8B-B14F-4D97-AF65-F5344CB8AC3E}">

</xml_diff>